<commit_message>
Add notes to most slides.
</commit_message>
<xml_diff>
--- a/LDA Presentation CECS 550.pptx
+++ b/LDA Presentation CECS 550.pptx
@@ -215,7 +215,7 @@
           <a:p>
             <a:fld id="{73B2889B-A0AC-4482-8592-5C96F2309420}" type="datetimeFigureOut">
               <a:rPr lang="en-US" smtClean="0"/>
-              <a:t>4/3/2023</a:t>
+              <a:t>4/4/2023</a:t>
             </a:fld>
             <a:endParaRPr lang="en-US"/>
           </a:p>
@@ -380,7 +380,7 @@
           <a:p>
             <a:fld id="{830EB223-FFC0-462A-A3B8-EAA7CE0F8CBD}" type="datetimeFigureOut">
               <a:rPr lang="en-US" smtClean="0"/>
-              <a:t>4/3/2023</a:t>
+              <a:t>4/4/2023</a:t>
             </a:fld>
             <a:endParaRPr lang="en-US" dirty="0"/>
           </a:p>
@@ -695,6 +695,89 @@
                 <a:effectLst/>
                 <a:latin typeface="Söhne"/>
               </a:rPr>
+              <a:t>Hello! Our group has chosen the paper “Robust and Sparse Linear Discriminant Analysis via an Alternating Direction Method of Multipliers.”</a:t>
+            </a:r>
+          </a:p>
+          <a:p>
+            <a:pPr algn="l"/>
+            <a:endParaRPr lang="en-US" b="0" i="0" dirty="0">
+              <a:solidFill>
+                <a:srgbClr val="000000"/>
+              </a:solidFill>
+              <a:effectLst/>
+              <a:latin typeface="Söhne"/>
+            </a:endParaRPr>
+          </a:p>
+          <a:p>
+            <a:pPr algn="l"/>
+            <a:endParaRPr lang="en-US" b="0" i="0" dirty="0">
+              <a:solidFill>
+                <a:srgbClr val="000000"/>
+              </a:solidFill>
+              <a:effectLst/>
+              <a:latin typeface="Söhne"/>
+            </a:endParaRPr>
+          </a:p>
+          <a:p>
+            <a:pPr algn="l"/>
+            <a:endParaRPr lang="en-US" b="0" i="0" dirty="0">
+              <a:solidFill>
+                <a:srgbClr val="000000"/>
+              </a:solidFill>
+              <a:effectLst/>
+              <a:latin typeface="Söhne"/>
+            </a:endParaRPr>
+          </a:p>
+          <a:p>
+            <a:pPr algn="l"/>
+            <a:endParaRPr lang="en-US" b="0" i="0" dirty="0">
+              <a:solidFill>
+                <a:srgbClr val="000000"/>
+              </a:solidFill>
+              <a:effectLst/>
+              <a:latin typeface="Söhne"/>
+            </a:endParaRPr>
+          </a:p>
+          <a:p>
+            <a:pPr algn="l"/>
+            <a:endParaRPr lang="en-US" b="0" i="0" dirty="0">
+              <a:solidFill>
+                <a:srgbClr val="000000"/>
+              </a:solidFill>
+              <a:effectLst/>
+              <a:latin typeface="Söhne"/>
+            </a:endParaRPr>
+          </a:p>
+          <a:p>
+            <a:pPr algn="l"/>
+            <a:endParaRPr lang="en-US" b="0" i="0" dirty="0">
+              <a:solidFill>
+                <a:srgbClr val="000000"/>
+              </a:solidFill>
+              <a:effectLst/>
+              <a:latin typeface="Söhne"/>
+            </a:endParaRPr>
+          </a:p>
+          <a:p>
+            <a:pPr algn="l"/>
+            <a:endParaRPr lang="en-US" b="0" i="0" dirty="0">
+              <a:solidFill>
+                <a:srgbClr val="000000"/>
+              </a:solidFill>
+              <a:effectLst/>
+              <a:latin typeface="Söhne"/>
+            </a:endParaRPr>
+          </a:p>
+          <a:p>
+            <a:pPr algn="l"/>
+            <a:r>
+              <a:rPr lang="en-US" b="0" i="0" dirty="0">
+                <a:solidFill>
+                  <a:srgbClr val="000000"/>
+                </a:solidFill>
+                <a:effectLst/>
+                <a:latin typeface="Söhne"/>
+              </a:rPr>
               <a:t>I. Introduction</a:t>
             </a:r>
           </a:p>
@@ -1062,30 +1145,17 @@
           <a:p>
             <a:r>
               <a:rPr lang="en-US" dirty="0"/>
-              <a:t>In order to test whether their Robust LDA has real improvement, the authors decided to test it against both artificial and real datasets. Here, they compare it against PCA, Principal Component Analysis, PCA with L1-norm, LDA, </a:t>
-            </a:r>
-            <a:r>
-              <a:rPr lang="en-US" dirty="0" err="1"/>
-              <a:t>regularlized</a:t>
-            </a:r>
+              <a:t>In conclusion, this paper introduces a robust and a robust sparse LDA by using L1-norm instead of L2-norm. We use ADMM to avoid issues with extracting a high number of features with fewer classes.</a:t>
+            </a:r>
+          </a:p>
+          <a:p>
+            <a:endParaRPr lang="en-US" dirty="0"/>
+          </a:p>
+          <a:p>
             <a:r>
               <a:rPr lang="en-US" dirty="0"/>
-              <a:t> LDA, LDA with L1-norm, and other methods.</a:t>
-            </a:r>
-          </a:p>
-          <a:p>
-            <a:endParaRPr lang="en-US" dirty="0"/>
-          </a:p>
-          <a:p>
-            <a:r>
-              <a:rPr lang="en-US" dirty="0"/>
-              <a:t>For their datasets, they created two datasets with 2 dimensions, with both dimensions being normally distributed with different parameters. Each dataset has 50 samples, but one dataset has one outlier and the other has two outliers. For the real dataset, they used the images of Indian female faces, with each image being 32x32 pixels and 8-bit grayscale. To test robustness, they add normally distributed noise to </a:t>
-            </a:r>
-            <a:r>
-              <a:rPr lang="en-US"/>
-              <a:t>each image.</a:t>
-            </a:r>
-            <a:endParaRPr lang="en-US" dirty="0"/>
+              <a:t>Bhattacharyya’s error bound can be used to prove the robustness in RLDA. RSLDA also works optimally on a small dataset if we wanted to extract a large number of features. Both features make it a very practical tool on real-world datasets, outperforming the current state of the art methods in terms of accuracy. It also performs similarly on synthetic datasets, proving it to be a versatile tool.</a:t>
+            </a:r>
           </a:p>
         </p:txBody>
       </p:sp>
@@ -1166,30 +1236,17 @@
           <a:p>
             <a:r>
               <a:rPr lang="en-US" dirty="0"/>
-              <a:t>In order to test whether their Robust LDA has real improvement, the authors decided to test it against both artificial and real datasets. Here, they compare it against PCA, Principal Component Analysis, PCA with L1-norm, LDA, </a:t>
-            </a:r>
-            <a:r>
-              <a:rPr lang="en-US" dirty="0" err="1"/>
-              <a:t>regularlized</a:t>
-            </a:r>
+              <a:t>And that’s it! I hope you learned the novel technique that helps improve LDA! Are there any questions?</a:t>
+            </a:r>
+          </a:p>
+          <a:p>
+            <a:endParaRPr lang="en-US" dirty="0"/>
+          </a:p>
+          <a:p>
             <a:r>
               <a:rPr lang="en-US" dirty="0"/>
-              <a:t> LDA, LDA with L1-norm, and other methods.</a:t>
-            </a:r>
-          </a:p>
-          <a:p>
-            <a:endParaRPr lang="en-US" dirty="0"/>
-          </a:p>
-          <a:p>
-            <a:r>
-              <a:rPr lang="en-US" dirty="0"/>
-              <a:t>For their datasets, they created two datasets with 2 dimensions, with both dimensions being normally distributed with different parameters. Each dataset has 50 samples, but one dataset has one outlier and the other has two outliers. For the real dataset, they used the images of Indian female faces, with each image being 32x32 pixels and 8-bit grayscale. To test robustness, they add normally distributed noise to </a:t>
-            </a:r>
-            <a:r>
-              <a:rPr lang="en-US"/>
-              <a:t>each image.</a:t>
-            </a:r>
-            <a:endParaRPr lang="en-US" dirty="0"/>
+              <a:t>[Linger on the slide a bit before going to citations.]</a:t>
+            </a:r>
           </a:p>
         </p:txBody>
       </p:sp>
@@ -1377,7 +1434,19 @@
           <a:bodyPr/>
           <a:lstStyle/>
           <a:p>
+            <a:r>
+              <a:rPr lang="en-US" dirty="0"/>
+              <a:t>As we know, Linear Discriminant Analysis is a method that separates two or more classes by projecting them on a lower-dimensional space. While LDA can be used as a linear classifier, we study its purpose as a dimensionality reducer, where it finds vectors pointing in the most discriminative direction by maximizing the between-class variance and minimizing the within-class variance, essentially separating the classes. Its purpose is twofold: LDA can perform feature extraction and the reduced dimensionality of datasets can speed up computation.</a:t>
+            </a:r>
+          </a:p>
+          <a:p>
             <a:endParaRPr lang="en-US" dirty="0"/>
+          </a:p>
+          <a:p>
+            <a:r>
+              <a:rPr lang="en-US" dirty="0"/>
+              <a:t>However, LDA is not without problems.</a:t>
+            </a:r>
           </a:p>
         </p:txBody>
       </p:sp>
@@ -1456,7 +1525,28 @@
           <a:bodyPr/>
           <a:lstStyle/>
           <a:p>
+            <a:r>
+              <a:rPr lang="en-US" dirty="0"/>
+              <a:t>For example, with high-dimensional data, some LDA methods can produce a large number of features, which may not improve the accuracy on models fed with LDA-fitted data.</a:t>
+            </a:r>
+          </a:p>
+          <a:p>
             <a:endParaRPr lang="en-US" dirty="0"/>
+          </a:p>
+          <a:p>
+            <a:r>
+              <a:rPr lang="en-US" dirty="0"/>
+              <a:t>Furthermore, typical LDA methods use normalization that is particularly sensitive to outliers. While this may not be a problem in synthetic datasets, real datasets, especially ones with many observations and features, have noisy data and labels. These outliers can exacerbate and can produce suboptimal classification accuracy.</a:t>
+            </a:r>
+          </a:p>
+          <a:p>
+            <a:endParaRPr lang="en-US" dirty="0"/>
+          </a:p>
+          <a:p>
+            <a:r>
+              <a:rPr lang="en-US" dirty="0"/>
+              <a:t>And further optimizations of LDA can produce suboptimal classification accuracy. Typically, LDA methods assume that all classes share the same covariance matrix. If they don’t, then the chance for misprediction only increases.</a:t>
+            </a:r>
           </a:p>
         </p:txBody>
       </p:sp>
@@ -1535,7 +1625,36 @@
           <a:bodyPr/>
           <a:lstStyle/>
           <a:p>
+            <a:r>
+              <a:rPr lang="en-US" dirty="0"/>
+              <a:t>It’s important to find solutions to LDA’s problems. As we mentioned, any outliers in the data, any overfitting or having too many features, and any false assumptions of the covariance matrix in the data can all produce suboptimal results.</a:t>
+            </a:r>
+          </a:p>
+          <a:p>
             <a:endParaRPr lang="en-US" dirty="0"/>
+          </a:p>
+          <a:p>
+            <a:pPr marL="0" marR="0" lvl="0" indent="0" algn="l" defTabSz="914400" rtl="0" eaLnBrk="1" fontAlgn="auto" latinLnBrk="0" hangingPunct="1">
+              <a:lnSpc>
+                <a:spcPct val="100000"/>
+              </a:lnSpc>
+              <a:spcBef>
+                <a:spcPts val="0"/>
+              </a:spcBef>
+              <a:spcAft>
+                <a:spcPts val="0"/>
+              </a:spcAft>
+              <a:buClrTx/>
+              <a:buSzTx/>
+              <a:buFontTx/>
+              <a:buNone/>
+              <a:tabLst/>
+              <a:defRPr/>
+            </a:pPr>
+            <a:r>
+              <a:rPr lang="en-US" dirty="0"/>
+              <a:t>These suboptimal results manifest in projection vectors not pointing in their idealized directions. This throws off LDA’s classification accuracy or, if used as feature extraction, its inability to find the most important vectors. It’s important to keep this in mind for real-world problems. This paper attempts to solve these problems by being more robust, or more resilient to outliers and noise, and using different methods than a typical LDA.</a:t>
+            </a:r>
           </a:p>
         </p:txBody>
       </p:sp>
@@ -1616,7 +1735,7 @@
           <a:p>
             <a:r>
               <a:rPr lang="en-US" dirty="0"/>
-              <a:t>Let’s talk about the paper’s contribution. We know that L1-norm provides more robustness to outliers and noise, but how? We can use Bhattacharyya’s error bound, a measure of how similar two distributions are. The two distributions we compare are the data and its dimensionally-reduced projection. Minimizing this error is essential in getting accurate reductions. Thankfully, the authors proved that it’s a close bound to Bayes’ irreducible error.</a:t>
+              <a:t>Let’s talk about the paper’s contribution. Previous research showed that L1-norm is more robust. The authors of this paper prove its robustness through Bhattacharyya’s error bound, a measure of how similar two distributions are. The two distributions we compare are the data and its dimensionally-reduced projection. Minimizing this error is essential in getting accurate reductions. Thankfully, the authors proved that it’s a close bound to Bayes’ irreducible error.</a:t>
             </a:r>
           </a:p>
           <a:p>
@@ -1633,7 +1752,7 @@
             </a:r>
             <a:r>
               <a:rPr lang="en-US" dirty="0"/>
-              <a:t>, but we use an Alternating Direction Method of Multipliers instead for L1-norm. Not only can it work with the nonconvex nature of LDA, it also doesn’t have the same restriction where the number of features must be one less than the number of classes.</a:t>
+              <a:t>, but we use an Alternating Direction Method of Multipliers instead for L1-norm. Not only can it work with the nonconvex nature of LDA, it also doesn’t have the same restriction where the number of features must be less than the number of classes minus one.</a:t>
             </a:r>
           </a:p>
           <a:p>
@@ -1642,7 +1761,7 @@
           <a:p>
             <a:r>
               <a:rPr lang="en-US" dirty="0"/>
-              <a:t>A variant of RLDA, Sparse RLDA, can work with fewer observations and extract more features.</a:t>
+              <a:t>A variant of RLDA, Robust Sparse LDA, can work with fewer observations and extract more features. It’s considered a variant because of an additional constraint on the discriminant direction. It typically performs worse than RLDA on data that works on both variants, but in some cases, it can perform better.</a:t>
             </a:r>
           </a:p>
         </p:txBody>
@@ -1823,30 +1942,17 @@
           <a:p>
             <a:r>
               <a:rPr lang="en-US" dirty="0"/>
-              <a:t>In order to test whether their Robust LDA has real improvement, the authors decided to test it against both artificial and real datasets. Here, they compare it against PCA, Principal Component Analysis, PCA with L1-norm, LDA, </a:t>
-            </a:r>
-            <a:r>
-              <a:rPr lang="en-US" dirty="0" err="1"/>
-              <a:t>regularlized</a:t>
-            </a:r>
+              <a:t>In order to test whether their Robust LDA has real improvement, the authors decided to test it against both artificial and real datasets. Here, they compare it against PCA, Principal Component Analysis, PCA with L1-norm, LDA, regularized LDA, LDA with L1-norm, and other methods.</a:t>
+            </a:r>
+          </a:p>
+          <a:p>
+            <a:endParaRPr lang="en-US" dirty="0"/>
+          </a:p>
+          <a:p>
             <a:r>
               <a:rPr lang="en-US" dirty="0"/>
-              <a:t> LDA, LDA with L1-norm, and other methods.</a:t>
-            </a:r>
-          </a:p>
-          <a:p>
-            <a:endParaRPr lang="en-US" dirty="0"/>
-          </a:p>
-          <a:p>
-            <a:r>
-              <a:rPr lang="en-US" dirty="0"/>
-              <a:t>For their datasets, they created two datasets with 2 dimensions, with both dimensions being normally distributed with different parameters. Each dataset has 50 samples, but one dataset has one outlier and the other has two outliers. For the real dataset, they used the images of Indian female faces, with each image being 32x32 pixels and 8-bit grayscale. To test robustness, they add normally distributed noise to </a:t>
-            </a:r>
-            <a:r>
-              <a:rPr lang="en-US"/>
-              <a:t>each image.</a:t>
-            </a:r>
-            <a:endParaRPr lang="en-US" dirty="0"/>
+              <a:t>They created two artificial datasets with 2 dimensions, with both dimensions being normally distributed with different parameters. Each dataset has 50 samples, but one dataset has one outlier and the other has two. For the real dataset, they used the images of Indian female faces, with each image being 32x32 pixels and 8-bit grayscale. To test robustness, they add normally distributed noise to each image. </a:t>
+            </a:r>
           </a:p>
         </p:txBody>
       </p:sp>
@@ -1925,7 +2031,19 @@
           <a:bodyPr/>
           <a:lstStyle/>
           <a:p>
+            <a:r>
+              <a:rPr lang="en-US" dirty="0"/>
+              <a:t>Here, we can see the table at the bottom left corner. The middle columns are how many training samples are in each class, starting at 2 up to 10. The rightmost column is the mean accuracy in the female Indian face dataset. Each row is a different method. The authors bolded the best accuracy in each column. It might be hard to see, but the bottom two rows are RLDA and RSLDA, respectively. They contain the best accuracy out of all the methods, with RLDA having the best mean accuracy of 86.47%. Note that we also show the time for each method, but we do not prioritize time as a metric. Plain LDA remains the fastest method but has all the issues we discussed.</a:t>
+            </a:r>
+          </a:p>
+          <a:p>
             <a:endParaRPr lang="en-US" dirty="0"/>
+          </a:p>
+          <a:p>
+            <a:r>
+              <a:rPr lang="en-US" dirty="0"/>
+              <a:t>Each method that they used had their parameters tuned on the datasets. If we look at L1-LDA, we find that it uses a minus formulation to avoid some problems with finding the best optimization.</a:t>
+            </a:r>
           </a:p>
         </p:txBody>
       </p:sp>
@@ -2004,7 +2122,19 @@
           <a:bodyPr/>
           <a:lstStyle/>
           <a:p>
+            <a:r>
+              <a:rPr lang="en-US" dirty="0"/>
+              <a:t>Because we use Bhattacharyya’s error bound to create a guarantee, we do not have to worry about the same issue with L1-LDA. This can explain how RLDA outperforms L1-LDA.</a:t>
+            </a:r>
+          </a:p>
+          <a:p>
             <a:endParaRPr lang="en-US" dirty="0"/>
+          </a:p>
+          <a:p>
+            <a:r>
+              <a:rPr lang="en-US" dirty="0"/>
+              <a:t>SULDA, or sparse uncorrelated LDA, are a group of methods that we test against. Despite SULDA-ADMM having the same optimization method we use, it does not consider robustness. SULDA with L1 norm is a faster variant of SULDA-ADMM due to another optimization technique, but at the expense of lower accuracy. Either SULDA model fails to consider both robustness and sparseness, so they perform worse.</a:t>
+            </a:r>
           </a:p>
         </p:txBody>
       </p:sp>
@@ -2168,7 +2298,7 @@
           <a:p>
             <a:fld id="{DECF21A4-E71B-4D3A-AF45-E989C23A7BB1}" type="datetimeFigureOut">
               <a:rPr lang="en-US" smtClean="0"/>
-              <a:t>4/3/2023</a:t>
+              <a:t>4/4/2023</a:t>
             </a:fld>
             <a:endParaRPr lang="en-US" dirty="0"/>
           </a:p>
@@ -2331,7 +2461,7 @@
           <a:p>
             <a:fld id="{DECF21A4-E71B-4D3A-AF45-E989C23A7BB1}" type="datetimeFigureOut">
               <a:rPr lang="en-US" smtClean="0"/>
-              <a:t>4/3/2023</a:t>
+              <a:t>4/4/2023</a:t>
             </a:fld>
             <a:endParaRPr lang="en-US" dirty="0"/>
           </a:p>
@@ -2504,7 +2634,7 @@
           <a:p>
             <a:fld id="{DECF21A4-E71B-4D3A-AF45-E989C23A7BB1}" type="datetimeFigureOut">
               <a:rPr lang="en-US" smtClean="0"/>
-              <a:t>4/3/2023</a:t>
+              <a:t>4/4/2023</a:t>
             </a:fld>
             <a:endParaRPr lang="en-US" dirty="0"/>
           </a:p>
@@ -2689,7 +2819,7 @@
           <a:p>
             <a:fld id="{DECF21A4-E71B-4D3A-AF45-E989C23A7BB1}" type="datetimeFigureOut">
               <a:rPr lang="en-US" smtClean="0"/>
-              <a:t>4/3/2023</a:t>
+              <a:t>4/4/2023</a:t>
             </a:fld>
             <a:endParaRPr lang="en-US" dirty="0"/>
           </a:p>
@@ -2853,7 +2983,7 @@
           <a:p>
             <a:fld id="{DECF21A4-E71B-4D3A-AF45-E989C23A7BB1}" type="datetimeFigureOut">
               <a:rPr lang="en-US" smtClean="0"/>
-              <a:t>4/3/2023</a:t>
+              <a:t>4/4/2023</a:t>
             </a:fld>
             <a:endParaRPr lang="en-US" dirty="0"/>
           </a:p>
@@ -3094,7 +3224,7 @@
           <a:p>
             <a:fld id="{DECF21A4-E71B-4D3A-AF45-E989C23A7BB1}" type="datetimeFigureOut">
               <a:rPr lang="en-US" smtClean="0"/>
-              <a:t>4/3/2023</a:t>
+              <a:t>4/4/2023</a:t>
             </a:fld>
             <a:endParaRPr lang="en-US" dirty="0"/>
           </a:p>
@@ -3319,7 +3449,7 @@
           <a:p>
             <a:fld id="{DECF21A4-E71B-4D3A-AF45-E989C23A7BB1}" type="datetimeFigureOut">
               <a:rPr lang="en-US" smtClean="0"/>
-              <a:t>4/3/2023</a:t>
+              <a:t>4/4/2023</a:t>
             </a:fld>
             <a:endParaRPr lang="en-US" dirty="0"/>
           </a:p>
@@ -3679,7 +3809,7 @@
           <a:p>
             <a:fld id="{DECF21A4-E71B-4D3A-AF45-E989C23A7BB1}" type="datetimeFigureOut">
               <a:rPr lang="en-US" smtClean="0"/>
-              <a:t>4/3/2023</a:t>
+              <a:t>4/4/2023</a:t>
             </a:fld>
             <a:endParaRPr lang="en-US" dirty="0"/>
           </a:p>
@@ -3792,7 +3922,7 @@
           <a:p>
             <a:fld id="{DECF21A4-E71B-4D3A-AF45-E989C23A7BB1}" type="datetimeFigureOut">
               <a:rPr lang="en-US" smtClean="0"/>
-              <a:t>4/3/2023</a:t>
+              <a:t>4/4/2023</a:t>
             </a:fld>
             <a:endParaRPr lang="en-US" dirty="0"/>
           </a:p>
@@ -3883,7 +4013,7 @@
           <a:p>
             <a:fld id="{DECF21A4-E71B-4D3A-AF45-E989C23A7BB1}" type="datetimeFigureOut">
               <a:rPr lang="en-US" smtClean="0"/>
-              <a:t>4/3/2023</a:t>
+              <a:t>4/4/2023</a:t>
             </a:fld>
             <a:endParaRPr lang="en-US" dirty="0"/>
           </a:p>
@@ -4154,7 +4284,7 @@
           <a:p>
             <a:fld id="{DECF21A4-E71B-4D3A-AF45-E989C23A7BB1}" type="datetimeFigureOut">
               <a:rPr lang="en-US" smtClean="0"/>
-              <a:t>4/3/2023</a:t>
+              <a:t>4/4/2023</a:t>
             </a:fld>
             <a:endParaRPr lang="en-US" dirty="0"/>
           </a:p>
@@ -4318,7 +4448,7 @@
           <a:p>
             <a:fld id="{DECF21A4-E71B-4D3A-AF45-E989C23A7BB1}" type="datetimeFigureOut">
               <a:rPr lang="en-US" smtClean="0"/>
-              <a:t>4/3/2023</a:t>
+              <a:t>4/4/2023</a:t>
             </a:fld>
             <a:endParaRPr lang="en-US" dirty="0"/>
           </a:p>
@@ -4565,7 +4695,7 @@
           <a:p>
             <a:fld id="{DECF21A4-E71B-4D3A-AF45-E989C23A7BB1}" type="datetimeFigureOut">
               <a:rPr lang="en-US" smtClean="0"/>
-              <a:t>4/3/2023</a:t>
+              <a:t>4/4/2023</a:t>
             </a:fld>
             <a:endParaRPr lang="en-US" dirty="0"/>
           </a:p>
@@ -4729,7 +4859,7 @@
           <a:p>
             <a:fld id="{DECF21A4-E71B-4D3A-AF45-E989C23A7BB1}" type="datetimeFigureOut">
               <a:rPr lang="en-US" smtClean="0"/>
-              <a:t>4/3/2023</a:t>
+              <a:t>4/4/2023</a:t>
             </a:fld>
             <a:endParaRPr lang="en-US" dirty="0"/>
           </a:p>
@@ -4903,7 +5033,7 @@
           <a:p>
             <a:fld id="{DECF21A4-E71B-4D3A-AF45-E989C23A7BB1}" type="datetimeFigureOut">
               <a:rPr lang="en-US" smtClean="0"/>
-              <a:t>4/3/2023</a:t>
+              <a:t>4/4/2023</a:t>
             </a:fld>
             <a:endParaRPr lang="en-US" dirty="0"/>
           </a:p>
@@ -5144,7 +5274,7 @@
           <a:p>
             <a:fld id="{DECF21A4-E71B-4D3A-AF45-E989C23A7BB1}" type="datetimeFigureOut">
               <a:rPr lang="en-US" smtClean="0"/>
-              <a:t>4/3/2023</a:t>
+              <a:t>4/4/2023</a:t>
             </a:fld>
             <a:endParaRPr lang="en-US" dirty="0"/>
           </a:p>
@@ -5368,7 +5498,7 @@
           <a:p>
             <a:fld id="{DECF21A4-E71B-4D3A-AF45-E989C23A7BB1}" type="datetimeFigureOut">
               <a:rPr lang="en-US" smtClean="0"/>
-              <a:t>4/3/2023</a:t>
+              <a:t>4/4/2023</a:t>
             </a:fld>
             <a:endParaRPr lang="en-US" dirty="0"/>
           </a:p>
@@ -5727,7 +5857,7 @@
           <a:p>
             <a:fld id="{DECF21A4-E71B-4D3A-AF45-E989C23A7BB1}" type="datetimeFigureOut">
               <a:rPr lang="en-US" smtClean="0"/>
-              <a:t>4/3/2023</a:t>
+              <a:t>4/4/2023</a:t>
             </a:fld>
             <a:endParaRPr lang="en-US" dirty="0"/>
           </a:p>
@@ -5839,7 +5969,7 @@
           <a:p>
             <a:fld id="{DECF21A4-E71B-4D3A-AF45-E989C23A7BB1}" type="datetimeFigureOut">
               <a:rPr lang="en-US" smtClean="0"/>
-              <a:t>4/3/2023</a:t>
+              <a:t>4/4/2023</a:t>
             </a:fld>
             <a:endParaRPr lang="en-US" dirty="0"/>
           </a:p>
@@ -5929,7 +6059,7 @@
           <a:p>
             <a:fld id="{DECF21A4-E71B-4D3A-AF45-E989C23A7BB1}" type="datetimeFigureOut">
               <a:rPr lang="en-US" smtClean="0"/>
-              <a:t>4/3/2023</a:t>
+              <a:t>4/4/2023</a:t>
             </a:fld>
             <a:endParaRPr lang="en-US" dirty="0"/>
           </a:p>
@@ -6199,7 +6329,7 @@
           <a:p>
             <a:fld id="{DECF21A4-E71B-4D3A-AF45-E989C23A7BB1}" type="datetimeFigureOut">
               <a:rPr lang="en-US" smtClean="0"/>
-              <a:t>4/3/2023</a:t>
+              <a:t>4/4/2023</a:t>
             </a:fld>
             <a:endParaRPr lang="en-US" dirty="0"/>
           </a:p>
@@ -6450,7 +6580,7 @@
           <a:p>
             <a:fld id="{DECF21A4-E71B-4D3A-AF45-E989C23A7BB1}" type="datetimeFigureOut">
               <a:rPr lang="en-US" smtClean="0"/>
-              <a:t>4/3/2023</a:t>
+              <a:t>4/4/2023</a:t>
             </a:fld>
             <a:endParaRPr lang="en-US" dirty="0"/>
           </a:p>
@@ -6656,7 +6786,7 @@
           <a:p>
             <a:fld id="{DECF21A4-E71B-4D3A-AF45-E989C23A7BB1}" type="datetimeFigureOut">
               <a:rPr lang="en-US" smtClean="0"/>
-              <a:t>4/3/2023</a:t>
+              <a:t>4/4/2023</a:t>
             </a:fld>
             <a:endParaRPr lang="en-US" dirty="0"/>
           </a:p>
@@ -7191,7 +7321,7 @@
           <a:p>
             <a:fld id="{DECF21A4-E71B-4D3A-AF45-E989C23A7BB1}" type="datetimeFigureOut">
               <a:rPr lang="en-US" smtClean="0"/>
-              <a:t>4/3/2023</a:t>
+              <a:t>4/4/2023</a:t>
             </a:fld>
             <a:endParaRPr lang="en-US" dirty="0"/>
           </a:p>
@@ -10335,8 +10465,8 @@
           </a:p>
         </p:txBody>
       </p:sp>
-      <mc:AlternateContent xmlns:mc="http://schemas.openxmlformats.org/markup-compatibility/2006">
-        <mc:Choice xmlns:a14="http://schemas.microsoft.com/office/drawing/2010/main" Requires="a14">
+      <mc:AlternateContent xmlns:mc="http://schemas.openxmlformats.org/markup-compatibility/2006" xmlns:a14="http://schemas.microsoft.com/office/drawing/2010/main">
+        <mc:Choice Requires="a14">
           <p:sp>
             <p:nvSpPr>
               <p:cNvPr id="3" name="TextBox 2"/>
@@ -10485,7 +10615,7 @@
             </p:txBody>
           </p:sp>
         </mc:Choice>
-        <mc:Fallback>
+        <mc:Fallback xmlns="">
           <p:sp>
             <p:nvSpPr>
               <p:cNvPr id="3" name="TextBox 2"/>

</xml_diff>

<commit_message>
Add more notes to Robust LDA by describing L1 and L2 norm.
</commit_message>
<xml_diff>
--- a/LDA Presentation CECS 550.pptx
+++ b/LDA Presentation CECS 550.pptx
@@ -1735,7 +1735,16 @@
           <a:p>
             <a:r>
               <a:rPr lang="en-US" dirty="0"/>
-              <a:t>Let’s talk about the paper’s contribution. Previous research showed that L1-norm is more robust. The authors of this paper prove its robustness through Bhattacharyya’s error bound, a measure of how similar two distributions are. The two distributions we compare are the data and its dimensionally-reduced projection. Minimizing this error is essential in getting accurate reductions. Thankfully, the authors proved that it’s a close bound to Bayes’ irreducible error.</a:t>
+              <a:t>Before we can talk about the paper’s contribution, let’s talk about how L1-norm is more robust. L1-norm is the sum of the absolute value of the entries in a given vector. In this case, we take the norm of the scatter of points that share the same class. Typical LDA methods use L2-norm, which struggles with a small sample size problem. Other researchers have formally proven that L1-norm is more robust than L2-norm, which is the driving factor as to why we use L1-norm in this new method.</a:t>
+            </a:r>
+          </a:p>
+          <a:p>
+            <a:endParaRPr lang="en-US" dirty="0"/>
+          </a:p>
+          <a:p>
+            <a:r>
+              <a:rPr lang="en-US" dirty="0"/>
+              <a:t>Now let’s talk about the paper’s contribution. In order to truly prove that L1-norm is the most appropriate for this problem, the authors of this paper prove its robustness through Bhattacharyya’s error bound, a measure of how similar two distributions are. The two distributions we compare are the data and its dimensionally-reduced projection. Minimizing this error is essential in getting accurate reductions. Thankfully, the authors proved that it’s a close bound to Bayes’ irreducible error.</a:t>
             </a:r>
           </a:p>
           <a:p>
@@ -1752,16 +1761,21 @@
             </a:r>
             <a:r>
               <a:rPr lang="en-US" dirty="0"/>
-              <a:t>, but we use an Alternating Direction Method of Multipliers instead for L1-norm. Not only can it work with the nonconvex nature of LDA, it also doesn’t have the same restriction where the number of features must be less than the number of classes minus one.</a:t>
-            </a:r>
-          </a:p>
-          <a:p>
+              <a:t>, but we use an Alternating Direction Method of Multipliers instead for L1-norm. Not only can it work with the nonconvex nature of LDA, it also doesn’t have the same restriction where the number of features must be less than the number of classes minus one (because that is the rank of the problem </a:t>
+            </a:r>
+            <a:r>
+              <a:rPr lang="en-US"/>
+              <a:t>instance matrix).</a:t>
+            </a:r>
             <a:endParaRPr lang="en-US" dirty="0"/>
           </a:p>
           <a:p>
+            <a:endParaRPr lang="en-US" dirty="0"/>
+          </a:p>
+          <a:p>
             <a:r>
               <a:rPr lang="en-US" dirty="0"/>
-              <a:t>A variant of RLDA, Robust Sparse LDA, can work with fewer observations and extract more features. It’s considered a variant because of an additional constraint on the discriminant direction. It typically performs worse than RLDA on data that works on both variants, but in some cases, it can perform better.</a:t>
+              <a:t>A variant of RLDA, Robust Sparse LDA, or RSLDA, can work with fewer observations and while being able to extract more features. It’s considered a variant because of an additional constraint on the discriminant direction during ADMM optimization. It typically performs worse than RLDA on data that works on both variants, but in some cases, it can perform better.</a:t>
             </a:r>
           </a:p>
         </p:txBody>

</xml_diff>